<commit_message>
Upload ppt and correct the description
</commit_message>
<xml_diff>
--- a/C# 期末.pptx
+++ b/C# 期末.pptx
@@ -107,6 +107,11 @@
       </a:defRPr>
     </a:lvl9pPr>
   </p:defaultTextStyle>
+  <p:extLst>
+    <p:ext uri="{EFAFB233-063F-42B5-8137-9DF3F51BA10A}">
+      <p15:sldGuideLst xmlns:p15="http://schemas.microsoft.com/office/powerpoint/2012/main"/>
+    </p:ext>
+  </p:extLst>
 </p:presentation>
 </file>
 
@@ -257,7 +262,7 @@
           <a:p>
             <a:fld id="{0EBB6EAB-0506-48B1-AC4F-4C2E57245A8E}" type="datetimeFigureOut">
               <a:rPr lang="zh-TW" altLang="en-US" smtClean="0"/>
-              <a:t>2024/12/21</a:t>
+              <a:t>2024/12/22</a:t>
             </a:fld>
             <a:endParaRPr lang="zh-TW" altLang="en-US"/>
           </a:p>
@@ -455,7 +460,7 @@
           <a:p>
             <a:fld id="{0EBB6EAB-0506-48B1-AC4F-4C2E57245A8E}" type="datetimeFigureOut">
               <a:rPr lang="zh-TW" altLang="en-US" smtClean="0"/>
-              <a:t>2024/12/21</a:t>
+              <a:t>2024/12/22</a:t>
             </a:fld>
             <a:endParaRPr lang="zh-TW" altLang="en-US"/>
           </a:p>
@@ -663,7 +668,7 @@
           <a:p>
             <a:fld id="{0EBB6EAB-0506-48B1-AC4F-4C2E57245A8E}" type="datetimeFigureOut">
               <a:rPr lang="zh-TW" altLang="en-US" smtClean="0"/>
-              <a:t>2024/12/21</a:t>
+              <a:t>2024/12/22</a:t>
             </a:fld>
             <a:endParaRPr lang="zh-TW" altLang="en-US"/>
           </a:p>
@@ -833,7 +838,7 @@
           <a:p>
             <a:fld id="{0EBB6EAB-0506-48B1-AC4F-4C2E57245A8E}" type="datetimeFigureOut">
               <a:rPr lang="zh-TW" altLang="en-US" smtClean="0"/>
-              <a:t>2024/12/21</a:t>
+              <a:t>2024/12/22</a:t>
             </a:fld>
             <a:endParaRPr lang="zh-TW" altLang="en-US"/>
           </a:p>
@@ -1136,7 +1141,7 @@
           <a:p>
             <a:fld id="{0EBB6EAB-0506-48B1-AC4F-4C2E57245A8E}" type="datetimeFigureOut">
               <a:rPr lang="zh-TW" altLang="en-US" smtClean="0"/>
-              <a:t>2024/12/21</a:t>
+              <a:t>2024/12/22</a:t>
             </a:fld>
             <a:endParaRPr lang="zh-TW" altLang="en-US"/>
           </a:p>
@@ -1401,7 +1406,7 @@
           <a:p>
             <a:fld id="{0EBB6EAB-0506-48B1-AC4F-4C2E57245A8E}" type="datetimeFigureOut">
               <a:rPr lang="zh-TW" altLang="en-US" smtClean="0"/>
-              <a:t>2024/12/21</a:t>
+              <a:t>2024/12/22</a:t>
             </a:fld>
             <a:endParaRPr lang="zh-TW" altLang="en-US"/>
           </a:p>
@@ -1813,7 +1818,7 @@
           <a:p>
             <a:fld id="{0EBB6EAB-0506-48B1-AC4F-4C2E57245A8E}" type="datetimeFigureOut">
               <a:rPr lang="zh-TW" altLang="en-US" smtClean="0"/>
-              <a:t>2024/12/21</a:t>
+              <a:t>2024/12/22</a:t>
             </a:fld>
             <a:endParaRPr lang="zh-TW" altLang="en-US"/>
           </a:p>
@@ -1954,7 +1959,7 @@
           <a:p>
             <a:fld id="{0EBB6EAB-0506-48B1-AC4F-4C2E57245A8E}" type="datetimeFigureOut">
               <a:rPr lang="zh-TW" altLang="en-US" smtClean="0"/>
-              <a:t>2024/12/21</a:t>
+              <a:t>2024/12/22</a:t>
             </a:fld>
             <a:endParaRPr lang="zh-TW" altLang="en-US"/>
           </a:p>
@@ -2067,7 +2072,7 @@
           <a:p>
             <a:fld id="{0EBB6EAB-0506-48B1-AC4F-4C2E57245A8E}" type="datetimeFigureOut">
               <a:rPr lang="zh-TW" altLang="en-US" smtClean="0"/>
-              <a:t>2024/12/21</a:t>
+              <a:t>2024/12/22</a:t>
             </a:fld>
             <a:endParaRPr lang="zh-TW" altLang="en-US"/>
           </a:p>
@@ -2378,7 +2383,7 @@
           <a:p>
             <a:fld id="{0EBB6EAB-0506-48B1-AC4F-4C2E57245A8E}" type="datetimeFigureOut">
               <a:rPr lang="zh-TW" altLang="en-US" smtClean="0"/>
-              <a:t>2024/12/21</a:t>
+              <a:t>2024/12/22</a:t>
             </a:fld>
             <a:endParaRPr lang="zh-TW" altLang="en-US"/>
           </a:p>
@@ -2666,7 +2671,7 @@
           <a:p>
             <a:fld id="{0EBB6EAB-0506-48B1-AC4F-4C2E57245A8E}" type="datetimeFigureOut">
               <a:rPr lang="zh-TW" altLang="en-US" smtClean="0"/>
-              <a:t>2024/12/21</a:t>
+              <a:t>2024/12/22</a:t>
             </a:fld>
             <a:endParaRPr lang="zh-TW" altLang="en-US"/>
           </a:p>
@@ -2907,7 +2912,7 @@
           <a:p>
             <a:fld id="{0EBB6EAB-0506-48B1-AC4F-4C2E57245A8E}" type="datetimeFigureOut">
               <a:rPr lang="zh-TW" altLang="en-US" smtClean="0"/>
-              <a:t>2024/12/21</a:t>
+              <a:t>2024/12/22</a:t>
             </a:fld>
             <a:endParaRPr lang="zh-TW" altLang="en-US"/>
           </a:p>
@@ -4557,10 +4562,10 @@
       </p:grpSpPr>
       <p:pic>
         <p:nvPicPr>
-          <p:cNvPr id="5" name="內容版面配置區 4">
-            <a:extLst>
-              <a:ext uri="{FF2B5EF4-FFF2-40B4-BE49-F238E27FC236}">
-                <a16:creationId xmlns:a16="http://schemas.microsoft.com/office/drawing/2014/main" id="{564C3743-FDBE-E16D-715A-08D11BBEFBB9}"/>
+          <p:cNvPr id="8" name="內容版面配置區 7">
+            <a:extLst>
+              <a:ext uri="{FF2B5EF4-FFF2-40B4-BE49-F238E27FC236}">
+                <a16:creationId xmlns:a16="http://schemas.microsoft.com/office/drawing/2014/main" id="{27E7E9C2-BC1A-2280-1E0D-43A546D39CCA}"/>
               </a:ext>
             </a:extLst>
           </p:cNvPr>
@@ -4579,8 +4584,8 @@
         </p:blipFill>
         <p:spPr>
           <a:xfrm>
-            <a:off x="344495" y="841777"/>
-            <a:ext cx="11346871" cy="5165484"/>
+            <a:off x="408702" y="1112192"/>
+            <a:ext cx="11215980" cy="5007254"/>
           </a:xfrm>
         </p:spPr>
       </p:pic>

</xml_diff>

<commit_message>
Add searching area in Ranking.aspx
</commit_message>
<xml_diff>
--- a/C# 期末.pptx
+++ b/C# 期末.pptx
@@ -7,8 +7,9 @@
   <p:sldIdLst>
     <p:sldId id="256" r:id="rId2"/>
     <p:sldId id="257" r:id="rId3"/>
-    <p:sldId id="258" r:id="rId4"/>
-    <p:sldId id="259" r:id="rId5"/>
+    <p:sldId id="260" r:id="rId4"/>
+    <p:sldId id="258" r:id="rId5"/>
+    <p:sldId id="259" r:id="rId6"/>
   </p:sldIdLst>
   <p:sldSz cx="12192000" cy="6858000"/>
   <p:notesSz cx="6858000" cy="9144000"/>
@@ -262,7 +263,7 @@
           <a:p>
             <a:fld id="{0EBB6EAB-0506-48B1-AC4F-4C2E57245A8E}" type="datetimeFigureOut">
               <a:rPr lang="zh-TW" altLang="en-US" smtClean="0"/>
-              <a:t>2024/12/23</a:t>
+              <a:t>2024/12/25</a:t>
             </a:fld>
             <a:endParaRPr lang="zh-TW" altLang="en-US"/>
           </a:p>
@@ -460,7 +461,7 @@
           <a:p>
             <a:fld id="{0EBB6EAB-0506-48B1-AC4F-4C2E57245A8E}" type="datetimeFigureOut">
               <a:rPr lang="zh-TW" altLang="en-US" smtClean="0"/>
-              <a:t>2024/12/23</a:t>
+              <a:t>2024/12/25</a:t>
             </a:fld>
             <a:endParaRPr lang="zh-TW" altLang="en-US"/>
           </a:p>
@@ -668,7 +669,7 @@
           <a:p>
             <a:fld id="{0EBB6EAB-0506-48B1-AC4F-4C2E57245A8E}" type="datetimeFigureOut">
               <a:rPr lang="zh-TW" altLang="en-US" smtClean="0"/>
-              <a:t>2024/12/23</a:t>
+              <a:t>2024/12/25</a:t>
             </a:fld>
             <a:endParaRPr lang="zh-TW" altLang="en-US"/>
           </a:p>
@@ -838,7 +839,7 @@
           <a:p>
             <a:fld id="{0EBB6EAB-0506-48B1-AC4F-4C2E57245A8E}" type="datetimeFigureOut">
               <a:rPr lang="zh-TW" altLang="en-US" smtClean="0"/>
-              <a:t>2024/12/23</a:t>
+              <a:t>2024/12/25</a:t>
             </a:fld>
             <a:endParaRPr lang="zh-TW" altLang="en-US"/>
           </a:p>
@@ -1141,7 +1142,7 @@
           <a:p>
             <a:fld id="{0EBB6EAB-0506-48B1-AC4F-4C2E57245A8E}" type="datetimeFigureOut">
               <a:rPr lang="zh-TW" altLang="en-US" smtClean="0"/>
-              <a:t>2024/12/23</a:t>
+              <a:t>2024/12/25</a:t>
             </a:fld>
             <a:endParaRPr lang="zh-TW" altLang="en-US"/>
           </a:p>
@@ -1406,7 +1407,7 @@
           <a:p>
             <a:fld id="{0EBB6EAB-0506-48B1-AC4F-4C2E57245A8E}" type="datetimeFigureOut">
               <a:rPr lang="zh-TW" altLang="en-US" smtClean="0"/>
-              <a:t>2024/12/23</a:t>
+              <a:t>2024/12/25</a:t>
             </a:fld>
             <a:endParaRPr lang="zh-TW" altLang="en-US"/>
           </a:p>
@@ -1818,7 +1819,7 @@
           <a:p>
             <a:fld id="{0EBB6EAB-0506-48B1-AC4F-4C2E57245A8E}" type="datetimeFigureOut">
               <a:rPr lang="zh-TW" altLang="en-US" smtClean="0"/>
-              <a:t>2024/12/23</a:t>
+              <a:t>2024/12/25</a:t>
             </a:fld>
             <a:endParaRPr lang="zh-TW" altLang="en-US"/>
           </a:p>
@@ -1959,7 +1960,7 @@
           <a:p>
             <a:fld id="{0EBB6EAB-0506-48B1-AC4F-4C2E57245A8E}" type="datetimeFigureOut">
               <a:rPr lang="zh-TW" altLang="en-US" smtClean="0"/>
-              <a:t>2024/12/23</a:t>
+              <a:t>2024/12/25</a:t>
             </a:fld>
             <a:endParaRPr lang="zh-TW" altLang="en-US"/>
           </a:p>
@@ -2072,7 +2073,7 @@
           <a:p>
             <a:fld id="{0EBB6EAB-0506-48B1-AC4F-4C2E57245A8E}" type="datetimeFigureOut">
               <a:rPr lang="zh-TW" altLang="en-US" smtClean="0"/>
-              <a:t>2024/12/23</a:t>
+              <a:t>2024/12/25</a:t>
             </a:fld>
             <a:endParaRPr lang="zh-TW" altLang="en-US"/>
           </a:p>
@@ -2383,7 +2384,7 @@
           <a:p>
             <a:fld id="{0EBB6EAB-0506-48B1-AC4F-4C2E57245A8E}" type="datetimeFigureOut">
               <a:rPr lang="zh-TW" altLang="en-US" smtClean="0"/>
-              <a:t>2024/12/23</a:t>
+              <a:t>2024/12/25</a:t>
             </a:fld>
             <a:endParaRPr lang="zh-TW" altLang="en-US"/>
           </a:p>
@@ -2671,7 +2672,7 @@
           <a:p>
             <a:fld id="{0EBB6EAB-0506-48B1-AC4F-4C2E57245A8E}" type="datetimeFigureOut">
               <a:rPr lang="zh-TW" altLang="en-US" smtClean="0"/>
-              <a:t>2024/12/23</a:t>
+              <a:t>2024/12/25</a:t>
             </a:fld>
             <a:endParaRPr lang="zh-TW" altLang="en-US"/>
           </a:p>
@@ -2912,7 +2913,7 @@
           <a:p>
             <a:fld id="{0EBB6EAB-0506-48B1-AC4F-4C2E57245A8E}" type="datetimeFigureOut">
               <a:rPr lang="zh-TW" altLang="en-US" smtClean="0"/>
-              <a:t>2024/12/23</a:t>
+              <a:t>2024/12/25</a:t>
             </a:fld>
             <a:endParaRPr lang="zh-TW" altLang="en-US"/>
           </a:p>
@@ -3542,6 +3543,86 @@
       </p:grpSpPr>
       <p:sp>
         <p:nvSpPr>
+          <p:cNvPr id="2" name="內容版面配置區 1">
+            <a:extLst>
+              <a:ext uri="{FF2B5EF4-FFF2-40B4-BE49-F238E27FC236}">
+                <a16:creationId xmlns:a16="http://schemas.microsoft.com/office/drawing/2014/main" id="{FDDFA6BC-69A9-EA30-2BAA-C959CBEF6C8A}"/>
+              </a:ext>
+            </a:extLst>
+          </p:cNvPr>
+          <p:cNvSpPr>
+            <a:spLocks noGrp="1"/>
+          </p:cNvSpPr>
+          <p:nvPr>
+            <p:ph idx="1"/>
+          </p:nvPr>
+        </p:nvSpPr>
+        <p:spPr/>
+        <p:txBody>
+          <a:bodyPr/>
+          <a:lstStyle/>
+          <a:p>
+            <a:endParaRPr lang="zh-TW" altLang="en-US"/>
+          </a:p>
+        </p:txBody>
+      </p:sp>
+      <p:sp>
+        <p:nvSpPr>
+          <p:cNvPr id="3" name="標題 2">
+            <a:extLst>
+              <a:ext uri="{FF2B5EF4-FFF2-40B4-BE49-F238E27FC236}">
+                <a16:creationId xmlns:a16="http://schemas.microsoft.com/office/drawing/2014/main" id="{01951CB3-08C2-3AC6-CF05-7B2B936C5B8C}"/>
+              </a:ext>
+            </a:extLst>
+          </p:cNvPr>
+          <p:cNvSpPr>
+            <a:spLocks noGrp="1"/>
+          </p:cNvSpPr>
+          <p:nvPr>
+            <p:ph type="title"/>
+          </p:nvPr>
+        </p:nvSpPr>
+        <p:spPr/>
+        <p:txBody>
+          <a:bodyPr/>
+          <a:lstStyle/>
+          <a:p>
+            <a:endParaRPr lang="zh-TW" altLang="en-US"/>
+          </a:p>
+        </p:txBody>
+      </p:sp>
+    </p:spTree>
+    <p:extLst>
+      <p:ext uri="{BB962C8B-B14F-4D97-AF65-F5344CB8AC3E}">
+        <p14:creationId xmlns:p14="http://schemas.microsoft.com/office/powerpoint/2010/main" val="2563661599"/>
+      </p:ext>
+    </p:extLst>
+  </p:cSld>
+  <p:clrMapOvr>
+    <a:masterClrMapping/>
+  </p:clrMapOvr>
+</p:sld>
+</file>
+
+<file path=ppt/slides/slide4.xml><?xml version="1.0" encoding="utf-8"?>
+<p:sld xmlns:a="http://schemas.openxmlformats.org/drawingml/2006/main" xmlns:r="http://schemas.openxmlformats.org/officeDocument/2006/relationships" xmlns:p="http://schemas.openxmlformats.org/presentationml/2006/main">
+  <p:cSld>
+    <p:spTree>
+      <p:nvGrpSpPr>
+        <p:cNvPr id="1" name=""/>
+        <p:cNvGrpSpPr/>
+        <p:nvPr/>
+      </p:nvGrpSpPr>
+      <p:grpSpPr>
+        <a:xfrm>
+          <a:off x="0" y="0"/>
+          <a:ext cx="0" cy="0"/>
+          <a:chOff x="0" y="0"/>
+          <a:chExt cx="0" cy="0"/>
+        </a:xfrm>
+      </p:grpSpPr>
+      <p:sp>
+        <p:nvSpPr>
           <p:cNvPr id="3" name="標題 2">
             <a:extLst>
               <a:ext uri="{FF2B5EF4-FFF2-40B4-BE49-F238E27FC236}">
@@ -4543,7 +4624,7 @@
 </p:sld>
 </file>
 
-<file path=ppt/slides/slide4.xml><?xml version="1.0" encoding="utf-8"?>
+<file path=ppt/slides/slide5.xml><?xml version="1.0" encoding="utf-8"?>
 <p:sld xmlns:a="http://schemas.openxmlformats.org/drawingml/2006/main" xmlns:r="http://schemas.openxmlformats.org/officeDocument/2006/relationships" xmlns:p="http://schemas.openxmlformats.org/presentationml/2006/main">
   <p:cSld>
     <p:spTree>

</xml_diff>